<commit_message>
Final minute changes to UI and functionality
</commit_message>
<xml_diff>
--- a/lpsPresentation.pptx
+++ b/lpsPresentation.pptx
@@ -270,7 +270,7 @@
           <a:p>
             <a:fld id="{DFD2A0F3-F842-4B91-AF3F-C4AED2E37FFF}" type="datetimeFigureOut">
               <a:rPr lang="en-IN" smtClean="0"/>
-              <a:t>03-08-2021</a:t>
+              <a:t>04-08-2021</a:t>
             </a:fld>
             <a:endParaRPr lang="en-IN"/>
           </a:p>
@@ -470,7 +470,7 @@
           <a:p>
             <a:fld id="{DFD2A0F3-F842-4B91-AF3F-C4AED2E37FFF}" type="datetimeFigureOut">
               <a:rPr lang="en-IN" smtClean="0"/>
-              <a:t>03-08-2021</a:t>
+              <a:t>04-08-2021</a:t>
             </a:fld>
             <a:endParaRPr lang="en-IN"/>
           </a:p>
@@ -680,7 +680,7 @@
           <a:p>
             <a:fld id="{DFD2A0F3-F842-4B91-AF3F-C4AED2E37FFF}" type="datetimeFigureOut">
               <a:rPr lang="en-IN" smtClean="0"/>
-              <a:t>03-08-2021</a:t>
+              <a:t>04-08-2021</a:t>
             </a:fld>
             <a:endParaRPr lang="en-IN"/>
           </a:p>
@@ -880,7 +880,7 @@
           <a:p>
             <a:fld id="{DFD2A0F3-F842-4B91-AF3F-C4AED2E37FFF}" type="datetimeFigureOut">
               <a:rPr lang="en-IN" smtClean="0"/>
-              <a:t>03-08-2021</a:t>
+              <a:t>04-08-2021</a:t>
             </a:fld>
             <a:endParaRPr lang="en-IN"/>
           </a:p>
@@ -1156,7 +1156,7 @@
           <a:p>
             <a:fld id="{DFD2A0F3-F842-4B91-AF3F-C4AED2E37FFF}" type="datetimeFigureOut">
               <a:rPr lang="en-IN" smtClean="0"/>
-              <a:t>03-08-2021</a:t>
+              <a:t>04-08-2021</a:t>
             </a:fld>
             <a:endParaRPr lang="en-IN"/>
           </a:p>
@@ -1424,7 +1424,7 @@
           <a:p>
             <a:fld id="{DFD2A0F3-F842-4B91-AF3F-C4AED2E37FFF}" type="datetimeFigureOut">
               <a:rPr lang="en-IN" smtClean="0"/>
-              <a:t>03-08-2021</a:t>
+              <a:t>04-08-2021</a:t>
             </a:fld>
             <a:endParaRPr lang="en-IN"/>
           </a:p>
@@ -1839,7 +1839,7 @@
           <a:p>
             <a:fld id="{DFD2A0F3-F842-4B91-AF3F-C4AED2E37FFF}" type="datetimeFigureOut">
               <a:rPr lang="en-IN" smtClean="0"/>
-              <a:t>03-08-2021</a:t>
+              <a:t>04-08-2021</a:t>
             </a:fld>
             <a:endParaRPr lang="en-IN"/>
           </a:p>
@@ -1981,7 +1981,7 @@
           <a:p>
             <a:fld id="{DFD2A0F3-F842-4B91-AF3F-C4AED2E37FFF}" type="datetimeFigureOut">
               <a:rPr lang="en-IN" smtClean="0"/>
-              <a:t>03-08-2021</a:t>
+              <a:t>04-08-2021</a:t>
             </a:fld>
             <a:endParaRPr lang="en-IN"/>
           </a:p>
@@ -2094,7 +2094,7 @@
           <a:p>
             <a:fld id="{DFD2A0F3-F842-4B91-AF3F-C4AED2E37FFF}" type="datetimeFigureOut">
               <a:rPr lang="en-IN" smtClean="0"/>
-              <a:t>03-08-2021</a:t>
+              <a:t>04-08-2021</a:t>
             </a:fld>
             <a:endParaRPr lang="en-IN"/>
           </a:p>
@@ -2407,7 +2407,7 @@
           <a:p>
             <a:fld id="{DFD2A0F3-F842-4B91-AF3F-C4AED2E37FFF}" type="datetimeFigureOut">
               <a:rPr lang="en-IN" smtClean="0"/>
-              <a:t>03-08-2021</a:t>
+              <a:t>04-08-2021</a:t>
             </a:fld>
             <a:endParaRPr lang="en-IN"/>
           </a:p>
@@ -2696,7 +2696,7 @@
           <a:p>
             <a:fld id="{DFD2A0F3-F842-4B91-AF3F-C4AED2E37FFF}" type="datetimeFigureOut">
               <a:rPr lang="en-IN" smtClean="0"/>
-              <a:t>03-08-2021</a:t>
+              <a:t>04-08-2021</a:t>
             </a:fld>
             <a:endParaRPr lang="en-IN"/>
           </a:p>
@@ -2776,11 +2776,12 @@
       <p:bgPr>
         <a:blipFill dpi="0" rotWithShape="1">
           <a:blip r:embed="rId13">
+            <a:alphaModFix amt="80000"/>
             <a:lum/>
           </a:blip>
           <a:srcRect/>
           <a:stretch>
-            <a:fillRect t="-39000" b="-39000"/>
+            <a:fillRect t="-15000" b="-15000"/>
           </a:stretch>
         </a:blipFill>
         <a:effectLst/>
@@ -2948,7 +2949,7 @@
           <a:p>
             <a:fld id="{DFD2A0F3-F842-4B91-AF3F-C4AED2E37FFF}" type="datetimeFigureOut">
               <a:rPr lang="en-IN" smtClean="0"/>
-              <a:t>03-08-2021</a:t>
+              <a:t>04-08-2021</a:t>
             </a:fld>
             <a:endParaRPr lang="en-IN"/>
           </a:p>
@@ -3629,6 +3630,21 @@
 <file path=ppt/slides/slide2.xml><?xml version="1.0" encoding="utf-8"?>
 <p:sld xmlns:a="http://schemas.openxmlformats.org/drawingml/2006/main" xmlns:r="http://schemas.openxmlformats.org/officeDocument/2006/relationships" xmlns:p="http://schemas.openxmlformats.org/presentationml/2006/main">
   <p:cSld>
+    <p:bg>
+      <p:bgPr>
+        <a:blipFill dpi="0" rotWithShape="1">
+          <a:blip r:embed="rId2">
+            <a:alphaModFix amt="52000"/>
+            <a:lum/>
+          </a:blip>
+          <a:srcRect/>
+          <a:stretch>
+            <a:fillRect t="-15000" b="-15000"/>
+          </a:stretch>
+        </a:blipFill>
+        <a:effectLst/>
+      </p:bgPr>
+    </p:bg>
     <p:spTree>
       <p:nvGrpSpPr>
         <p:cNvPr id="1" name=""/>
@@ -4834,11 +4850,11 @@
           <a:lstStyle/>
           <a:p>
             <a:r>
-              <a:rPr lang="en-US"/>
+              <a:rPr lang="en-US" dirty="0"/>
               <a:t>			  </a:t>
             </a:r>
             <a:r>
-              <a:rPr lang="en-US">
+              <a:rPr lang="en-US" dirty="0">
                 <a:latin typeface="Times New Roman" panose="02020603050405020304" pitchFamily="18" charset="0"/>
                 <a:cs typeface="Times New Roman" panose="02020603050405020304" pitchFamily="18" charset="0"/>
               </a:rPr>
@@ -4867,14 +4883,6 @@
 <file path=ppt/slides/slide4.xml><?xml version="1.0" encoding="utf-8"?>
 <p:sld xmlns:a="http://schemas.openxmlformats.org/drawingml/2006/main" xmlns:r="http://schemas.openxmlformats.org/officeDocument/2006/relationships" xmlns:p="http://schemas.openxmlformats.org/presentationml/2006/main">
   <p:cSld>
-    <p:bg>
-      <p:bgPr>
-        <a:solidFill>
-          <a:schemeClr val="bg1"/>
-        </a:solidFill>
-        <a:effectLst/>
-      </p:bgPr>
-    </p:bg>
     <p:spTree>
       <p:nvGrpSpPr>
         <p:cNvPr id="1" name=""/>
@@ -5056,6 +5064,21 @@
 <file path=ppt/slides/slide6.xml><?xml version="1.0" encoding="utf-8"?>
 <p:sld xmlns:a="http://schemas.openxmlformats.org/drawingml/2006/main" xmlns:r="http://schemas.openxmlformats.org/officeDocument/2006/relationships" xmlns:p="http://schemas.openxmlformats.org/presentationml/2006/main">
   <p:cSld>
+    <p:bg>
+      <p:bgPr>
+        <a:blipFill dpi="0" rotWithShape="1">
+          <a:blip r:embed="rId2">
+            <a:alphaModFix amt="51000"/>
+            <a:lum/>
+          </a:blip>
+          <a:srcRect/>
+          <a:stretch>
+            <a:fillRect t="-15000" b="-15000"/>
+          </a:stretch>
+        </a:blipFill>
+        <a:effectLst/>
+      </p:bgPr>
+    </p:bg>
     <p:spTree>
       <p:nvGrpSpPr>
         <p:cNvPr id="1" name=""/>
@@ -5088,57 +5111,21 @@
         </p:nvSpPr>
         <p:spPr>
           <a:xfrm>
-            <a:off x="839788" y="931178"/>
-            <a:ext cx="4722113" cy="5258485"/>
+            <a:off x="797668" y="931178"/>
+            <a:ext cx="5194570" cy="3906340"/>
           </a:xfrm>
         </p:spPr>
         <p:txBody>
           <a:bodyPr>
-            <a:normAutofit/>
+            <a:normAutofit lnSpcReduction="10000"/>
           </a:bodyPr>
           <a:lstStyle/>
           <a:p>
             <a:pPr marL="0" indent="0">
               <a:buNone/>
             </a:pPr>
-            <a:endParaRPr lang="en-US" sz="1800" dirty="0">
-              <a:latin typeface="Times New Roman" panose="02020603050405020304" pitchFamily="18" charset="0"/>
-              <a:cs typeface="Times New Roman" panose="02020603050405020304" pitchFamily="18" charset="0"/>
-            </a:endParaRPr>
-          </a:p>
-          <a:p>
-            <a:pPr marL="0" indent="0">
-              <a:buNone/>
-            </a:pPr>
-            <a:endParaRPr lang="en-US" sz="1800" dirty="0">
-              <a:latin typeface="Times New Roman" panose="02020603050405020304" pitchFamily="18" charset="0"/>
-              <a:cs typeface="Times New Roman" panose="02020603050405020304" pitchFamily="18" charset="0"/>
-            </a:endParaRPr>
-          </a:p>
-          <a:p>
-            <a:pPr marL="0" indent="0">
-              <a:buNone/>
-            </a:pPr>
-            <a:endParaRPr lang="en-US" sz="1800" dirty="0">
-              <a:latin typeface="Times New Roman" panose="02020603050405020304" pitchFamily="18" charset="0"/>
-              <a:cs typeface="Times New Roman" panose="02020603050405020304" pitchFamily="18" charset="0"/>
-            </a:endParaRPr>
-          </a:p>
-          <a:p>
-            <a:pPr marL="0" indent="0">
-              <a:buNone/>
-            </a:pPr>
-            <a:endParaRPr lang="en-US" sz="1800" dirty="0">
-              <a:latin typeface="Times New Roman" panose="02020603050405020304" pitchFamily="18" charset="0"/>
-              <a:cs typeface="Times New Roman" panose="02020603050405020304" pitchFamily="18" charset="0"/>
-            </a:endParaRPr>
-          </a:p>
-          <a:p>
-            <a:pPr marL="0" indent="0">
-              <a:buNone/>
-            </a:pPr>
-            <a:r>
-              <a:rPr lang="en-US" sz="2600" dirty="0">
+            <a:r>
+              <a:rPr lang="en-US" sz="2600" b="1" dirty="0">
                 <a:latin typeface="Times New Roman" panose="02020603050405020304" pitchFamily="18" charset="0"/>
                 <a:cs typeface="Times New Roman" panose="02020603050405020304" pitchFamily="18" charset="0"/>
               </a:rPr>
@@ -5147,37 +5134,30 @@
           </a:p>
           <a:p>
             <a:r>
-              <a:rPr lang="en-US" sz="1800">
+              <a:rPr lang="en-US" sz="2400" dirty="0">
                 <a:latin typeface="Times New Roman" panose="02020603050405020304" pitchFamily="18" charset="0"/>
                 <a:cs typeface="Times New Roman" panose="02020603050405020304" pitchFamily="18" charset="0"/>
               </a:rPr>
               <a:t>Fully </a:t>
             </a:r>
             <a:r>
-              <a:rPr lang="en-US" sz="1800" i="1" u="sng">
+              <a:rPr lang="en-US" sz="2400" i="1" u="sng" dirty="0">
                 <a:latin typeface="Times New Roman" panose="02020603050405020304" pitchFamily="18" charset="0"/>
                 <a:cs typeface="Times New Roman" panose="02020603050405020304" pitchFamily="18" charset="0"/>
               </a:rPr>
               <a:t>Responsive</a:t>
             </a:r>
             <a:r>
-              <a:rPr lang="en-US" sz="1800">
+              <a:rPr lang="en-US" sz="2400" dirty="0">
                 <a:latin typeface="Times New Roman" panose="02020603050405020304" pitchFamily="18" charset="0"/>
                 <a:cs typeface="Times New Roman" panose="02020603050405020304" pitchFamily="18" charset="0"/>
               </a:rPr>
-              <a:t> </a:t>
-            </a:r>
-            <a:r>
-              <a:rPr lang="en-US" sz="1800" dirty="0">
-                <a:latin typeface="Times New Roman" panose="02020603050405020304" pitchFamily="18" charset="0"/>
-                <a:cs typeface="Times New Roman" panose="02020603050405020304" pitchFamily="18" charset="0"/>
-              </a:rPr>
-              <a:t>Front-end </a:t>
-            </a:r>
-          </a:p>
-          <a:p>
-            <a:r>
-              <a:rPr lang="en-US" sz="1800" dirty="0">
+              <a:t> Front-end </a:t>
+            </a:r>
+          </a:p>
+          <a:p>
+            <a:r>
+              <a:rPr lang="en-US" sz="2400" dirty="0">
                 <a:latin typeface="Times New Roman" panose="02020603050405020304" pitchFamily="18" charset="0"/>
                 <a:cs typeface="Times New Roman" panose="02020603050405020304" pitchFamily="18" charset="0"/>
               </a:rPr>
@@ -5186,28 +5166,28 @@
           </a:p>
           <a:p>
             <a:r>
-              <a:rPr lang="en-US" sz="1800" dirty="0">
+              <a:rPr lang="en-US" sz="2400" dirty="0">
                 <a:latin typeface="Times New Roman" panose="02020603050405020304" pitchFamily="18" charset="0"/>
                 <a:cs typeface="Times New Roman" panose="02020603050405020304" pitchFamily="18" charset="0"/>
               </a:rPr>
               <a:t>Added pages for </a:t>
             </a:r>
             <a:r>
-              <a:rPr lang="en-US" sz="1800" i="1" u="sng" dirty="0">
+              <a:rPr lang="en-US" sz="2400" i="1" u="sng" dirty="0">
                 <a:latin typeface="Times New Roman" panose="02020603050405020304" pitchFamily="18" charset="0"/>
                 <a:cs typeface="Times New Roman" panose="02020603050405020304" pitchFamily="18" charset="0"/>
               </a:rPr>
               <a:t>Help</a:t>
             </a:r>
             <a:r>
-              <a:rPr lang="en-US" sz="1800" dirty="0">
+              <a:rPr lang="en-US" sz="2400" dirty="0">
                 <a:latin typeface="Times New Roman" panose="02020603050405020304" pitchFamily="18" charset="0"/>
                 <a:cs typeface="Times New Roman" panose="02020603050405020304" pitchFamily="18" charset="0"/>
               </a:rPr>
               <a:t> and </a:t>
             </a:r>
             <a:r>
-              <a:rPr lang="en-US" sz="1800" i="1" u="sng" dirty="0">
+              <a:rPr lang="en-US" sz="2400" i="1" u="sng" dirty="0">
                 <a:latin typeface="Times New Roman" panose="02020603050405020304" pitchFamily="18" charset="0"/>
                 <a:cs typeface="Times New Roman" panose="02020603050405020304" pitchFamily="18" charset="0"/>
               </a:rPr>
@@ -5216,7 +5196,7 @@
           </a:p>
           <a:p>
             <a:r>
-              <a:rPr lang="en-US" sz="1800" dirty="0">
+              <a:rPr lang="en-US" sz="2400" dirty="0">
                 <a:latin typeface="Times New Roman" panose="02020603050405020304" pitchFamily="18" charset="0"/>
                 <a:cs typeface="Times New Roman" panose="02020603050405020304" pitchFamily="18" charset="0"/>
               </a:rPr>
@@ -5225,18 +5205,20 @@
           </a:p>
           <a:p>
             <a:r>
-              <a:rPr lang="en-US" sz="1800" dirty="0" err="1">
+              <a:rPr lang="en-US" sz="2400" dirty="0">
                 <a:latin typeface="Times New Roman" panose="02020603050405020304" pitchFamily="18" charset="0"/>
                 <a:cs typeface="Times New Roman" panose="02020603050405020304" pitchFamily="18" charset="0"/>
               </a:rPr>
-              <a:t>Unsplash</a:t>
-            </a:r>
-            <a:r>
-              <a:rPr lang="en-US" sz="1800" dirty="0">
+              <a:t>Unsplash API</a:t>
+            </a:r>
+          </a:p>
+          <a:p>
+            <a:r>
+              <a:rPr lang="en-US" sz="2400" dirty="0">
                 <a:latin typeface="Times New Roman" panose="02020603050405020304" pitchFamily="18" charset="0"/>
                 <a:cs typeface="Times New Roman" panose="02020603050405020304" pitchFamily="18" charset="0"/>
               </a:rPr>
-              <a:t> API</a:t>
+              <a:t>Download Loan Application</a:t>
             </a:r>
           </a:p>
           <a:p>
@@ -5265,13 +5247,13 @@
         </p:nvSpPr>
         <p:spPr>
           <a:xfrm>
-            <a:off x="6442744" y="931178"/>
-            <a:ext cx="4912643" cy="5258486"/>
+            <a:off x="7279357" y="931178"/>
+            <a:ext cx="4912643" cy="3037708"/>
           </a:xfrm>
         </p:spPr>
         <p:txBody>
           <a:bodyPr>
-            <a:normAutofit/>
+            <a:normAutofit lnSpcReduction="10000"/>
           </a:bodyPr>
           <a:lstStyle/>
           <a:p>
@@ -5279,20 +5261,20 @@
               <a:buNone/>
             </a:pPr>
             <a:r>
-              <a:rPr lang="en-US" sz="2600" dirty="0">
+              <a:rPr lang="en-US" sz="2600" b="1" dirty="0">
                 <a:latin typeface="Times New Roman" panose="02020603050405020304" pitchFamily="18" charset="0"/>
                 <a:cs typeface="Times New Roman" panose="02020603050405020304" pitchFamily="18" charset="0"/>
               </a:rPr>
               <a:t>CRUD Operations:</a:t>
             </a:r>
-            <a:endParaRPr lang="en-US" sz="1900" i="1" u="sng" dirty="0">
+            <a:endParaRPr lang="en-US" sz="1900" b="1" i="1" u="sng" dirty="0">
               <a:latin typeface="Times New Roman" panose="02020603050405020304" pitchFamily="18" charset="0"/>
               <a:cs typeface="Times New Roman" panose="02020603050405020304" pitchFamily="18" charset="0"/>
             </a:endParaRPr>
           </a:p>
           <a:p>
             <a:r>
-              <a:rPr lang="en-US" sz="1900" dirty="0">
+              <a:rPr lang="en-US" sz="2400" dirty="0">
                 <a:latin typeface="Times New Roman" panose="02020603050405020304" pitchFamily="18" charset="0"/>
                 <a:cs typeface="Times New Roman" panose="02020603050405020304" pitchFamily="18" charset="0"/>
               </a:rPr>
@@ -5301,7 +5283,7 @@
           </a:p>
           <a:p>
             <a:r>
-              <a:rPr lang="en-US" sz="1900" dirty="0">
+              <a:rPr lang="en-US" sz="2400" dirty="0">
                 <a:latin typeface="Times New Roman" panose="02020603050405020304" pitchFamily="18" charset="0"/>
                 <a:cs typeface="Times New Roman" panose="02020603050405020304" pitchFamily="18" charset="0"/>
               </a:rPr>
@@ -5310,7 +5292,7 @@
           </a:p>
           <a:p>
             <a:r>
-              <a:rPr lang="en-US" sz="1900" dirty="0">
+              <a:rPr lang="en-US" sz="2400" dirty="0">
                 <a:latin typeface="Times New Roman" panose="02020603050405020304" pitchFamily="18" charset="0"/>
                 <a:cs typeface="Times New Roman" panose="02020603050405020304" pitchFamily="18" charset="0"/>
               </a:rPr>
@@ -5319,7 +5301,7 @@
           </a:p>
           <a:p>
             <a:r>
-              <a:rPr lang="en-US" sz="1900" dirty="0">
+              <a:rPr lang="en-US" sz="2400" dirty="0">
                 <a:latin typeface="Times New Roman" panose="02020603050405020304" pitchFamily="18" charset="0"/>
                 <a:cs typeface="Times New Roman" panose="02020603050405020304" pitchFamily="18" charset="0"/>
               </a:rPr>
@@ -5328,7 +5310,7 @@
           </a:p>
           <a:p>
             <a:r>
-              <a:rPr lang="en-US" sz="1900" dirty="0">
+              <a:rPr lang="en-US" sz="2400" dirty="0">
                 <a:latin typeface="Times New Roman" panose="02020603050405020304" pitchFamily="18" charset="0"/>
                 <a:cs typeface="Times New Roman" panose="02020603050405020304" pitchFamily="18" charset="0"/>
               </a:rPr>
@@ -5337,73 +5319,12 @@
           </a:p>
           <a:p>
             <a:r>
-              <a:rPr lang="en-US" sz="1900" dirty="0">
+              <a:rPr lang="en-US" sz="2400" dirty="0">
                 <a:latin typeface="Times New Roman" panose="02020603050405020304" pitchFamily="18" charset="0"/>
                 <a:cs typeface="Times New Roman" panose="02020603050405020304" pitchFamily="18" charset="0"/>
               </a:rPr>
               <a:t>Delete      </a:t>
             </a:r>
-          </a:p>
-          <a:p>
-            <a:endParaRPr lang="en-US" sz="1900" dirty="0">
-              <a:latin typeface="Times New Roman" panose="02020603050405020304" pitchFamily="18" charset="0"/>
-              <a:cs typeface="Times New Roman" panose="02020603050405020304" pitchFamily="18" charset="0"/>
-            </a:endParaRPr>
-          </a:p>
-          <a:p>
-            <a:pPr marL="0" indent="0">
-              <a:buNone/>
-            </a:pPr>
-            <a:r>
-              <a:rPr lang="en-US" sz="2800" dirty="0">
-                <a:latin typeface="Times New Roman" panose="02020603050405020304" pitchFamily="18" charset="0"/>
-                <a:cs typeface="Times New Roman" panose="02020603050405020304" pitchFamily="18" charset="0"/>
-              </a:rPr>
-              <a:t>Security: </a:t>
-            </a:r>
-          </a:p>
-          <a:p>
-            <a:r>
-              <a:rPr lang="en-US" sz="2000" dirty="0">
-                <a:latin typeface="Times New Roman" panose="02020603050405020304" pitchFamily="18" charset="0"/>
-                <a:cs typeface="Times New Roman" panose="02020603050405020304" pitchFamily="18" charset="0"/>
-              </a:rPr>
-              <a:t>DB verified </a:t>
-            </a:r>
-            <a:r>
-              <a:rPr lang="en-US" sz="2000" i="1" u="sng" dirty="0">
-                <a:latin typeface="Times New Roman" panose="02020603050405020304" pitchFamily="18" charset="0"/>
-                <a:cs typeface="Times New Roman" panose="02020603050405020304" pitchFamily="18" charset="0"/>
-              </a:rPr>
-              <a:t>Login &amp; Registration</a:t>
-            </a:r>
-          </a:p>
-          <a:p>
-            <a:r>
-              <a:rPr lang="en-US" sz="2000" dirty="0">
-                <a:latin typeface="Times New Roman" panose="02020603050405020304" pitchFamily="18" charset="0"/>
-                <a:cs typeface="Times New Roman" panose="02020603050405020304" pitchFamily="18" charset="0"/>
-              </a:rPr>
-              <a:t>Independent Entities</a:t>
-            </a:r>
-          </a:p>
-          <a:p>
-            <a:pPr marL="0" indent="0">
-              <a:buNone/>
-            </a:pPr>
-            <a:r>
-              <a:rPr lang="en-US" sz="1600" dirty="0">
-                <a:latin typeface="Times New Roman" panose="02020603050405020304" pitchFamily="18" charset="0"/>
-                <a:cs typeface="Times New Roman" panose="02020603050405020304" pitchFamily="18" charset="0"/>
-              </a:rPr>
-              <a:t>    User-Entity &amp; Loan Applicant Entity</a:t>
-            </a:r>
-          </a:p>
-          <a:p>
-            <a:endParaRPr lang="en-US" sz="1900" dirty="0">
-              <a:latin typeface="Times New Roman" panose="02020603050405020304" pitchFamily="18" charset="0"/>
-              <a:cs typeface="Times New Roman" panose="02020603050405020304" pitchFamily="18" charset="0"/>
-            </a:endParaRPr>
           </a:p>
           <a:p>
             <a:pPr marL="0" indent="0">
@@ -5422,6 +5343,291 @@
           </a:p>
           <a:p>
             <a:pPr marL="0" indent="0">
+              <a:buNone/>
+            </a:pPr>
+            <a:endParaRPr lang="en-IN" dirty="0">
+              <a:latin typeface="Times New Roman" panose="02020603050405020304" pitchFamily="18" charset="0"/>
+              <a:cs typeface="Times New Roman" panose="02020603050405020304" pitchFamily="18" charset="0"/>
+            </a:endParaRPr>
+          </a:p>
+        </p:txBody>
+      </p:sp>
+      <p:sp>
+        <p:nvSpPr>
+          <p:cNvPr id="5" name="Content Placeholder 5">
+            <a:extLst>
+              <a:ext uri="{FF2B5EF4-FFF2-40B4-BE49-F238E27FC236}">
+                <a16:creationId xmlns:a16="http://schemas.microsoft.com/office/drawing/2014/main" id="{7C2E6199-B277-4EE1-9D12-9936131B323A}"/>
+              </a:ext>
+            </a:extLst>
+          </p:cNvPr>
+          <p:cNvSpPr txBox="1">
+            <a:spLocks/>
+          </p:cNvSpPr>
+          <p:nvPr/>
+        </p:nvSpPr>
+        <p:spPr>
+          <a:xfrm>
+            <a:off x="3694801" y="3968886"/>
+            <a:ext cx="6040877" cy="2461097"/>
+          </a:xfrm>
+          <a:prstGeom prst="rect">
+            <a:avLst/>
+          </a:prstGeom>
+        </p:spPr>
+        <p:txBody>
+          <a:bodyPr vert="horz" lIns="91440" tIns="45720" rIns="91440" bIns="45720" rtlCol="0">
+            <a:normAutofit/>
+          </a:bodyPr>
+          <a:lstStyle>
+            <a:lvl1pPr marL="228600" indent="-228600" algn="l" defTabSz="914400" rtl="0" eaLnBrk="1" latinLnBrk="0" hangingPunct="1">
+              <a:lnSpc>
+                <a:spcPct val="90000"/>
+              </a:lnSpc>
+              <a:spcBef>
+                <a:spcPts val="1000"/>
+              </a:spcBef>
+              <a:buFont typeface="Arial" panose="020B0604020202020204" pitchFamily="34" charset="0"/>
+              <a:buChar char="•"/>
+              <a:defRPr sz="2800" kern="1200">
+                <a:solidFill>
+                  <a:schemeClr val="tx1"/>
+                </a:solidFill>
+                <a:latin typeface="+mn-lt"/>
+                <a:ea typeface="+mn-ea"/>
+                <a:cs typeface="+mn-cs"/>
+              </a:defRPr>
+            </a:lvl1pPr>
+            <a:lvl2pPr marL="685800" indent="-228600" algn="l" defTabSz="914400" rtl="0" eaLnBrk="1" latinLnBrk="0" hangingPunct="1">
+              <a:lnSpc>
+                <a:spcPct val="90000"/>
+              </a:lnSpc>
+              <a:spcBef>
+                <a:spcPts val="500"/>
+              </a:spcBef>
+              <a:buFont typeface="Arial" panose="020B0604020202020204" pitchFamily="34" charset="0"/>
+              <a:buChar char="•"/>
+              <a:defRPr sz="2400" kern="1200">
+                <a:solidFill>
+                  <a:schemeClr val="tx1"/>
+                </a:solidFill>
+                <a:latin typeface="+mn-lt"/>
+                <a:ea typeface="+mn-ea"/>
+                <a:cs typeface="+mn-cs"/>
+              </a:defRPr>
+            </a:lvl2pPr>
+            <a:lvl3pPr marL="1143000" indent="-228600" algn="l" defTabSz="914400" rtl="0" eaLnBrk="1" latinLnBrk="0" hangingPunct="1">
+              <a:lnSpc>
+                <a:spcPct val="90000"/>
+              </a:lnSpc>
+              <a:spcBef>
+                <a:spcPts val="500"/>
+              </a:spcBef>
+              <a:buFont typeface="Arial" panose="020B0604020202020204" pitchFamily="34" charset="0"/>
+              <a:buChar char="•"/>
+              <a:defRPr sz="2000" kern="1200">
+                <a:solidFill>
+                  <a:schemeClr val="tx1"/>
+                </a:solidFill>
+                <a:latin typeface="+mn-lt"/>
+                <a:ea typeface="+mn-ea"/>
+                <a:cs typeface="+mn-cs"/>
+              </a:defRPr>
+            </a:lvl3pPr>
+            <a:lvl4pPr marL="1600200" indent="-228600" algn="l" defTabSz="914400" rtl="0" eaLnBrk="1" latinLnBrk="0" hangingPunct="1">
+              <a:lnSpc>
+                <a:spcPct val="90000"/>
+              </a:lnSpc>
+              <a:spcBef>
+                <a:spcPts val="500"/>
+              </a:spcBef>
+              <a:buFont typeface="Arial" panose="020B0604020202020204" pitchFamily="34" charset="0"/>
+              <a:buChar char="•"/>
+              <a:defRPr sz="1800" kern="1200">
+                <a:solidFill>
+                  <a:schemeClr val="tx1"/>
+                </a:solidFill>
+                <a:latin typeface="+mn-lt"/>
+                <a:ea typeface="+mn-ea"/>
+                <a:cs typeface="+mn-cs"/>
+              </a:defRPr>
+            </a:lvl4pPr>
+            <a:lvl5pPr marL="2057400" indent="-228600" algn="l" defTabSz="914400" rtl="0" eaLnBrk="1" latinLnBrk="0" hangingPunct="1">
+              <a:lnSpc>
+                <a:spcPct val="90000"/>
+              </a:lnSpc>
+              <a:spcBef>
+                <a:spcPts val="500"/>
+              </a:spcBef>
+              <a:buFont typeface="Arial" panose="020B0604020202020204" pitchFamily="34" charset="0"/>
+              <a:buChar char="•"/>
+              <a:defRPr sz="1800" kern="1200">
+                <a:solidFill>
+                  <a:schemeClr val="tx1"/>
+                </a:solidFill>
+                <a:latin typeface="+mn-lt"/>
+                <a:ea typeface="+mn-ea"/>
+                <a:cs typeface="+mn-cs"/>
+              </a:defRPr>
+            </a:lvl5pPr>
+            <a:lvl6pPr marL="2514600" indent="-228600" algn="l" defTabSz="914400" rtl="0" eaLnBrk="1" latinLnBrk="0" hangingPunct="1">
+              <a:lnSpc>
+                <a:spcPct val="90000"/>
+              </a:lnSpc>
+              <a:spcBef>
+                <a:spcPts val="500"/>
+              </a:spcBef>
+              <a:buFont typeface="Arial" panose="020B0604020202020204" pitchFamily="34" charset="0"/>
+              <a:buChar char="•"/>
+              <a:defRPr sz="1800" kern="1200">
+                <a:solidFill>
+                  <a:schemeClr val="tx1"/>
+                </a:solidFill>
+                <a:latin typeface="+mn-lt"/>
+                <a:ea typeface="+mn-ea"/>
+                <a:cs typeface="+mn-cs"/>
+              </a:defRPr>
+            </a:lvl6pPr>
+            <a:lvl7pPr marL="2971800" indent="-228600" algn="l" defTabSz="914400" rtl="0" eaLnBrk="1" latinLnBrk="0" hangingPunct="1">
+              <a:lnSpc>
+                <a:spcPct val="90000"/>
+              </a:lnSpc>
+              <a:spcBef>
+                <a:spcPts val="500"/>
+              </a:spcBef>
+              <a:buFont typeface="Arial" panose="020B0604020202020204" pitchFamily="34" charset="0"/>
+              <a:buChar char="•"/>
+              <a:defRPr sz="1800" kern="1200">
+                <a:solidFill>
+                  <a:schemeClr val="tx1"/>
+                </a:solidFill>
+                <a:latin typeface="+mn-lt"/>
+                <a:ea typeface="+mn-ea"/>
+                <a:cs typeface="+mn-cs"/>
+              </a:defRPr>
+            </a:lvl7pPr>
+            <a:lvl8pPr marL="3429000" indent="-228600" algn="l" defTabSz="914400" rtl="0" eaLnBrk="1" latinLnBrk="0" hangingPunct="1">
+              <a:lnSpc>
+                <a:spcPct val="90000"/>
+              </a:lnSpc>
+              <a:spcBef>
+                <a:spcPts val="500"/>
+              </a:spcBef>
+              <a:buFont typeface="Arial" panose="020B0604020202020204" pitchFamily="34" charset="0"/>
+              <a:buChar char="•"/>
+              <a:defRPr sz="1800" kern="1200">
+                <a:solidFill>
+                  <a:schemeClr val="tx1"/>
+                </a:solidFill>
+                <a:latin typeface="+mn-lt"/>
+                <a:ea typeface="+mn-ea"/>
+                <a:cs typeface="+mn-cs"/>
+              </a:defRPr>
+            </a:lvl8pPr>
+            <a:lvl9pPr marL="3886200" indent="-228600" algn="l" defTabSz="914400" rtl="0" eaLnBrk="1" latinLnBrk="0" hangingPunct="1">
+              <a:lnSpc>
+                <a:spcPct val="90000"/>
+              </a:lnSpc>
+              <a:spcBef>
+                <a:spcPts val="500"/>
+              </a:spcBef>
+              <a:buFont typeface="Arial" panose="020B0604020202020204" pitchFamily="34" charset="0"/>
+              <a:buChar char="•"/>
+              <a:defRPr sz="1800" kern="1200">
+                <a:solidFill>
+                  <a:schemeClr val="tx1"/>
+                </a:solidFill>
+                <a:latin typeface="+mn-lt"/>
+                <a:ea typeface="+mn-ea"/>
+                <a:cs typeface="+mn-cs"/>
+              </a:defRPr>
+            </a:lvl9pPr>
+          </a:lstStyle>
+          <a:p>
+            <a:pPr marL="0" indent="0">
+              <a:buNone/>
+            </a:pPr>
+            <a:endParaRPr lang="en-US" sz="1900" dirty="0">
+              <a:latin typeface="Times New Roman" panose="02020603050405020304" pitchFamily="18" charset="0"/>
+              <a:cs typeface="Times New Roman" panose="02020603050405020304" pitchFamily="18" charset="0"/>
+            </a:endParaRPr>
+          </a:p>
+          <a:p>
+            <a:pPr marL="0" indent="0">
+              <a:buFont typeface="Arial" panose="020B0604020202020204" pitchFamily="34" charset="0"/>
+              <a:buNone/>
+            </a:pPr>
+            <a:r>
+              <a:rPr lang="en-US" b="1" dirty="0">
+                <a:latin typeface="Times New Roman" panose="02020603050405020304" pitchFamily="18" charset="0"/>
+                <a:cs typeface="Times New Roman" panose="02020603050405020304" pitchFamily="18" charset="0"/>
+              </a:rPr>
+              <a:t>Security: </a:t>
+            </a:r>
+          </a:p>
+          <a:p>
+            <a:r>
+              <a:rPr lang="en-US" sz="2400" dirty="0">
+                <a:latin typeface="Times New Roman" panose="02020603050405020304" pitchFamily="18" charset="0"/>
+                <a:cs typeface="Times New Roman" panose="02020603050405020304" pitchFamily="18" charset="0"/>
+              </a:rPr>
+              <a:t>DB verified </a:t>
+            </a:r>
+            <a:r>
+              <a:rPr lang="en-US" sz="2400" i="1" u="sng" dirty="0">
+                <a:latin typeface="Times New Roman" panose="02020603050405020304" pitchFamily="18" charset="0"/>
+                <a:cs typeface="Times New Roman" panose="02020603050405020304" pitchFamily="18" charset="0"/>
+              </a:rPr>
+              <a:t>Login &amp; Registration</a:t>
+            </a:r>
+          </a:p>
+          <a:p>
+            <a:r>
+              <a:rPr lang="en-US" sz="2400" dirty="0">
+                <a:latin typeface="Times New Roman" panose="02020603050405020304" pitchFamily="18" charset="0"/>
+                <a:cs typeface="Times New Roman" panose="02020603050405020304" pitchFamily="18" charset="0"/>
+              </a:rPr>
+              <a:t>Independent DB Entities</a:t>
+            </a:r>
+          </a:p>
+          <a:p>
+            <a:pPr marL="0" indent="0">
+              <a:buFont typeface="Arial" panose="020B0604020202020204" pitchFamily="34" charset="0"/>
+              <a:buNone/>
+            </a:pPr>
+            <a:r>
+              <a:rPr lang="en-US" sz="2400" dirty="0">
+                <a:latin typeface="Times New Roman" panose="02020603050405020304" pitchFamily="18" charset="0"/>
+                <a:cs typeface="Times New Roman" panose="02020603050405020304" pitchFamily="18" charset="0"/>
+              </a:rPr>
+              <a:t>    User-Entity &amp; Loan Applicant Entity</a:t>
+            </a:r>
+          </a:p>
+          <a:p>
+            <a:endParaRPr lang="en-US" sz="1900" dirty="0">
+              <a:latin typeface="Times New Roman" panose="02020603050405020304" pitchFamily="18" charset="0"/>
+              <a:cs typeface="Times New Roman" panose="02020603050405020304" pitchFamily="18" charset="0"/>
+            </a:endParaRPr>
+          </a:p>
+          <a:p>
+            <a:pPr marL="0" indent="0">
+              <a:buFont typeface="Arial" panose="020B0604020202020204" pitchFamily="34" charset="0"/>
+              <a:buNone/>
+            </a:pPr>
+            <a:endParaRPr lang="en-US" sz="1900" dirty="0">
+              <a:latin typeface="Times New Roman" panose="02020603050405020304" pitchFamily="18" charset="0"/>
+              <a:cs typeface="Times New Roman" panose="02020603050405020304" pitchFamily="18" charset="0"/>
+            </a:endParaRPr>
+          </a:p>
+          <a:p>
+            <a:endParaRPr lang="en-IN" dirty="0">
+              <a:latin typeface="Times New Roman" panose="02020603050405020304" pitchFamily="18" charset="0"/>
+              <a:cs typeface="Times New Roman" panose="02020603050405020304" pitchFamily="18" charset="0"/>
+            </a:endParaRPr>
+          </a:p>
+          <a:p>
+            <a:pPr marL="0" indent="0">
+              <a:buFont typeface="Arial" panose="020B0604020202020204" pitchFamily="34" charset="0"/>
               <a:buNone/>
             </a:pPr>
             <a:endParaRPr lang="en-IN" dirty="0">
@@ -5518,6 +5724,21 @@
 <file path=ppt/slides/slide8.xml><?xml version="1.0" encoding="utf-8"?>
 <p:sld xmlns:a="http://schemas.openxmlformats.org/drawingml/2006/main" xmlns:r="http://schemas.openxmlformats.org/officeDocument/2006/relationships" xmlns:p="http://schemas.openxmlformats.org/presentationml/2006/main">
   <p:cSld>
+    <p:bg>
+      <p:bgPr>
+        <a:blipFill dpi="0" rotWithShape="1">
+          <a:blip r:embed="rId2">
+            <a:alphaModFix amt="51000"/>
+            <a:lum/>
+          </a:blip>
+          <a:srcRect/>
+          <a:stretch>
+            <a:fillRect t="-15000" b="-15000"/>
+          </a:stretch>
+        </a:blipFill>
+        <a:effectLst/>
+      </p:bgPr>
+    </p:bg>
     <p:spTree>
       <p:nvGrpSpPr>
         <p:cNvPr id="1" name=""/>
@@ -5550,13 +5771,13 @@
         </p:nvSpPr>
         <p:spPr>
           <a:xfrm>
-            <a:off x="838200" y="2383277"/>
-            <a:ext cx="10515600" cy="3793686"/>
+            <a:off x="838200" y="710119"/>
+            <a:ext cx="10515600" cy="5466844"/>
           </a:xfrm>
         </p:spPr>
         <p:txBody>
           <a:bodyPr>
-            <a:normAutofit fontScale="92500" lnSpcReduction="20000"/>
+            <a:normAutofit/>
           </a:bodyPr>
           <a:lstStyle/>
           <a:p>
@@ -5633,50 +5854,16 @@
                 <a:latin typeface="Times New Roman" panose="02020603050405020304" pitchFamily="18" charset="0"/>
                 <a:cs typeface="Times New Roman" panose="02020603050405020304" pitchFamily="18" charset="0"/>
               </a:rPr>
-              <a:t>Pop Up Issue on login/registration failure: The controller </a:t>
-            </a:r>
-            <a:r>
-              <a:rPr lang="en-US" sz="2400" dirty="0">
-                <a:latin typeface="Times New Roman" panose="02020603050405020304" pitchFamily="18" charset="0"/>
-                <a:cs typeface="Times New Roman" panose="02020603050405020304" pitchFamily="18" charset="0"/>
-              </a:rPr>
-              <a:t>was </a:t>
-            </a:r>
-            <a:r>
-              <a:rPr lang="en-US" sz="2400" b="0" i="0" dirty="0">
+              <a:t>Pop Up Issue on login/</a:t>
+            </a:r>
+            <a:r>
+              <a:rPr lang="en-US" sz="2400" b="0" i="0">
                 <a:effectLst/>
                 <a:latin typeface="Times New Roman" panose="02020603050405020304" pitchFamily="18" charset="0"/>
                 <a:cs typeface="Times New Roman" panose="02020603050405020304" pitchFamily="18" charset="0"/>
               </a:rPr>
-              <a:t>server-side code. It </a:t>
-            </a:r>
-            <a:r>
-              <a:rPr lang="en-US" sz="2400" dirty="0">
-                <a:latin typeface="Times New Roman" panose="02020603050405020304" pitchFamily="18" charset="0"/>
-                <a:cs typeface="Times New Roman" panose="02020603050405020304" pitchFamily="18" charset="0"/>
-              </a:rPr>
-              <a:t>was</a:t>
-            </a:r>
-            <a:r>
-              <a:rPr lang="en-US" sz="2400" b="0" i="0" dirty="0">
-                <a:effectLst/>
-                <a:latin typeface="Times New Roman" panose="02020603050405020304" pitchFamily="18" charset="0"/>
-                <a:cs typeface="Times New Roman" panose="02020603050405020304" pitchFamily="18" charset="0"/>
-              </a:rPr>
-              <a:t> not possible to show a dialog box on our client from server-side code.</a:t>
-            </a:r>
-            <a:endParaRPr lang="en-US" sz="2400" dirty="0">
-              <a:latin typeface="Times New Roman" panose="02020603050405020304" pitchFamily="18" charset="0"/>
-              <a:cs typeface="Times New Roman" panose="02020603050405020304" pitchFamily="18" charset="0"/>
-            </a:endParaRPr>
-          </a:p>
-          <a:p>
-            <a:endParaRPr lang="en-US" sz="2400" dirty="0">
-              <a:latin typeface="Times New Roman" panose="02020603050405020304" pitchFamily="18" charset="0"/>
-              <a:cs typeface="Times New Roman" panose="02020603050405020304" pitchFamily="18" charset="0"/>
-            </a:endParaRPr>
-          </a:p>
-          <a:p>
+              <a:t>registration failure</a:t>
+            </a:r>
             <a:endParaRPr lang="en-US" sz="2400" dirty="0">
               <a:latin typeface="Times New Roman" panose="02020603050405020304" pitchFamily="18" charset="0"/>
               <a:cs typeface="Times New Roman" panose="02020603050405020304" pitchFamily="18" charset="0"/>
@@ -5766,8 +5953,8 @@
         </p:nvSpPr>
         <p:spPr>
           <a:xfrm>
-            <a:off x="898321" y="1767485"/>
-            <a:ext cx="10515600" cy="4348089"/>
+            <a:off x="898321" y="1527243"/>
+            <a:ext cx="10515600" cy="4588331"/>
           </a:xfrm>
           <a:prstGeom prst="rect">
             <a:avLst/>
@@ -5797,50 +5984,6 @@
             </a:lvl1pPr>
           </a:lstStyle>
           <a:p>
-            <a:pPr marL="571500" indent="-571500">
-              <a:buFont typeface="Arial" panose="020B0604020202020204" pitchFamily="34" charset="0"/>
-              <a:buChar char="•"/>
-            </a:pPr>
-            <a:endParaRPr lang="en-US" sz="2800" dirty="0">
-              <a:latin typeface="Times New Roman" panose="02020603050405020304" pitchFamily="18" charset="0"/>
-              <a:cs typeface="Times New Roman" panose="02020603050405020304" pitchFamily="18" charset="0"/>
-            </a:endParaRPr>
-          </a:p>
-          <a:p>
-            <a:pPr marL="571500" indent="-571500">
-              <a:buFont typeface="Arial" panose="020B0604020202020204" pitchFamily="34" charset="0"/>
-              <a:buChar char="•"/>
-            </a:pPr>
-            <a:endParaRPr lang="en-US" sz="2800">
-              <a:latin typeface="Times New Roman" panose="02020603050405020304" pitchFamily="18" charset="0"/>
-              <a:cs typeface="Times New Roman" panose="02020603050405020304" pitchFamily="18" charset="0"/>
-            </a:endParaRPr>
-          </a:p>
-          <a:p>
-            <a:pPr marL="571500" indent="-571500">
-              <a:buFont typeface="Arial" panose="020B0604020202020204" pitchFamily="34" charset="0"/>
-              <a:buChar char="•"/>
-            </a:pPr>
-            <a:r>
-              <a:rPr lang="en-US" sz="2800">
-                <a:latin typeface="Times New Roman" panose="02020603050405020304" pitchFamily="18" charset="0"/>
-                <a:cs typeface="Times New Roman" panose="02020603050405020304" pitchFamily="18" charset="0"/>
-              </a:rPr>
-              <a:t>Download </a:t>
-            </a:r>
-            <a:r>
-              <a:rPr lang="en-US" sz="2800" dirty="0">
-                <a:latin typeface="Times New Roman" panose="02020603050405020304" pitchFamily="18" charset="0"/>
-                <a:cs typeface="Times New Roman" panose="02020603050405020304" pitchFamily="18" charset="0"/>
-              </a:rPr>
-              <a:t>form</a:t>
-            </a:r>
-          </a:p>
-          <a:p>
-            <a:pPr marL="571500" indent="-571500">
-              <a:buFont typeface="Arial" panose="020B0604020202020204" pitchFamily="34" charset="0"/>
-              <a:buChar char="•"/>
-            </a:pPr>
             <a:endParaRPr lang="en-US" sz="2800" dirty="0">
               <a:latin typeface="Times New Roman" panose="02020603050405020304" pitchFamily="18" charset="0"/>
               <a:cs typeface="Times New Roman" panose="02020603050405020304" pitchFamily="18" charset="0"/>

</xml_diff>